<commit_message>
[~] Lecture7: changed slide order, changed some wording
</commit_message>
<xml_diff>
--- a/Lectures/7.Microarchitecture/Lecture7.pptx
+++ b/Lectures/7.Microarchitecture/Lecture7.pptx
@@ -28,8 +28,8 @@
     <p:sldId id="353" r:id="rId19"/>
     <p:sldId id="328" r:id="rId20"/>
     <p:sldId id="335" r:id="rId21"/>
-    <p:sldId id="334" r:id="rId22"/>
-    <p:sldId id="330" r:id="rId23"/>
+    <p:sldId id="330" r:id="rId22"/>
+    <p:sldId id="334" r:id="rId23"/>
     <p:sldId id="342" r:id="rId24"/>
     <p:sldId id="336" r:id="rId25"/>
     <p:sldId id="345" r:id="rId26"/>
@@ -1804,7 +1804,7 @@
     </p:spTree>
     <p:extLst>
       <p:ext uri="{BB962C8B-B14F-4D97-AF65-F5344CB8AC3E}">
-        <p14:creationId xmlns:p14="http://schemas.microsoft.com/office/powerpoint/2010/main" val="2503851318"/>
+        <p14:creationId xmlns:p14="http://schemas.microsoft.com/office/powerpoint/2010/main" val="2824927917"/>
       </p:ext>
     </p:extLst>
   </p:cSld>
@@ -1888,7 +1888,7 @@
     </p:spTree>
     <p:extLst>
       <p:ext uri="{BB962C8B-B14F-4D97-AF65-F5344CB8AC3E}">
-        <p14:creationId xmlns:p14="http://schemas.microsoft.com/office/powerpoint/2010/main" val="2824927917"/>
+        <p14:creationId xmlns:p14="http://schemas.microsoft.com/office/powerpoint/2010/main" val="2503851318"/>
       </p:ext>
     </p:extLst>
   </p:cSld>
@@ -14732,7 +14732,7 @@
           <p:cNvPr id="2" name="Заголовок 1">
             <a:extLst>
               <a:ext uri="{FF2B5EF4-FFF2-40B4-BE49-F238E27FC236}">
-                <a16:creationId xmlns:a16="http://schemas.microsoft.com/office/drawing/2014/main" id="{A70406AD-7D2D-86D5-3079-BA49C57178AF}"/>
+                <a16:creationId xmlns:a16="http://schemas.microsoft.com/office/drawing/2014/main" id="{9A45F6A7-E77F-1454-CA76-42E9CC59AAD6}"/>
               </a:ext>
             </a:extLst>
           </p:cNvPr>
@@ -14743,15 +14743,38 @@
             <p:ph type="title"/>
           </p:nvPr>
         </p:nvSpPr>
-        <p:spPr/>
+        <p:spPr>
+          <a:xfrm>
+            <a:off x="838200" y="276485"/>
+            <a:ext cx="11430600" cy="1325563"/>
+          </a:xfrm>
+        </p:spPr>
         <p:txBody>
           <a:bodyPr/>
           <a:lstStyle/>
           <a:p>
             <a:r>
               <a:rPr lang="ru-RU" dirty="0"/>
-              <a:t>Ложные зависимости</a:t>
-            </a:r>
+              <a:t>Разрыв зависимостей по данным. Переименование регистров. </a:t>
+            </a:r>
+            <a:r>
+              <a:rPr kumimoji="0" lang="ru-RU" sz="1600" b="0" i="0" u="none" strike="noStrike" kern="1200" cap="none" spc="0" normalizeH="0" baseline="0" noProof="0" dirty="0">
+                <a:ln>
+                  <a:noFill/>
+                </a:ln>
+                <a:solidFill>
+                  <a:prstClr val="black"/>
+                </a:solidFill>
+                <a:effectLst/>
+                <a:uLnTx/>
+                <a:uFillTx/>
+                <a:latin typeface="Calibri Light" panose="020F0302020204030204"/>
+                <a:ea typeface="+mj-ea"/>
+                <a:cs typeface="+mj-cs"/>
+              </a:rPr>
+              <a:t>(пример)</a:t>
+            </a:r>
+            <a:endParaRPr lang="ru-RU" dirty="0"/>
           </a:p>
         </p:txBody>
       </p:sp>
@@ -14760,7 +14783,7 @@
           <p:cNvPr id="3" name="Объект 2">
             <a:extLst>
               <a:ext uri="{FF2B5EF4-FFF2-40B4-BE49-F238E27FC236}">
-                <a16:creationId xmlns:a16="http://schemas.microsoft.com/office/drawing/2014/main" id="{BC0D2D4A-9A20-FA69-D8EA-4CADBD5A82BB}"/>
+                <a16:creationId xmlns:a16="http://schemas.microsoft.com/office/drawing/2014/main" id="{3386D23F-1D1C-9972-A5D4-20308CC48FE1}"/>
               </a:ext>
             </a:extLst>
           </p:cNvPr>
@@ -14771,7 +14794,12 @@
             <p:ph idx="1"/>
           </p:nvPr>
         </p:nvSpPr>
-        <p:spPr/>
+        <p:spPr>
+          <a:xfrm>
+            <a:off x="838200" y="1602048"/>
+            <a:ext cx="11178000" cy="3985152"/>
+          </a:xfrm>
+        </p:spPr>
         <p:txBody>
           <a:bodyPr>
             <a:normAutofit/>
@@ -14783,7 +14811,35 @@
             </a:pPr>
             <a:r>
               <a:rPr lang="ru-RU" sz="2000" dirty="0"/>
-              <a:t>В некоторых случаях зависимость, существующая с точки зрения ЦП, в реальности не влияет на исход работы программы.</a:t>
+              <a:t>Для увеличения производительности  используется механизм </a:t>
+            </a:r>
+            <a:r>
+              <a:rPr lang="ru-RU" sz="2000" b="1" dirty="0"/>
+              <a:t>переименования регистров</a:t>
+            </a:r>
+            <a:r>
+              <a:rPr lang="ru-RU" sz="2000" dirty="0"/>
+              <a:t>, который позволяет избавиться от </a:t>
+            </a:r>
+            <a:r>
+              <a:rPr lang="en-US" sz="2000" dirty="0" err="1"/>
+              <a:t>WaR</a:t>
+            </a:r>
+            <a:r>
+              <a:rPr lang="en-US" sz="2000" dirty="0"/>
+              <a:t>/</a:t>
+            </a:r>
+            <a:r>
+              <a:rPr lang="en-US" sz="2000" dirty="0" err="1"/>
+              <a:t>WaW</a:t>
+            </a:r>
+            <a:r>
+              <a:rPr lang="en-US" sz="2000" dirty="0"/>
+              <a:t>-</a:t>
+            </a:r>
+            <a:r>
+              <a:rPr lang="ru-RU" sz="2000" dirty="0"/>
+              <a:t>зависимостей.</a:t>
             </a:r>
           </a:p>
           <a:p>
@@ -14792,39 +14848,15 @@
             </a:pPr>
             <a:r>
               <a:rPr lang="ru-RU" sz="2000" dirty="0"/>
-              <a:t>Причиной ложных зависимостей является работа с частью регистра без перезаписи всего регистра (например, выполнение скалярных операций </a:t>
+              <a:t>На аппаратном уровне в регистровом файле есть </a:t>
             </a:r>
             <a:r>
               <a:rPr lang="en-US" sz="2000" dirty="0"/>
-              <a:t>SSE </a:t>
+              <a:t>&gt;100 </a:t>
             </a:r>
             <a:r>
               <a:rPr lang="ru-RU" sz="2000" dirty="0"/>
-              <a:t>без предшествующего </a:t>
-            </a:r>
-            <a:r>
-              <a:rPr lang="en-US" sz="2000" dirty="0"/>
-              <a:t>PXOR </a:t>
-            </a:r>
-            <a:r>
-              <a:rPr lang="ru-RU" sz="2000" dirty="0"/>
-              <a:t>или работа с </a:t>
-            </a:r>
-            <a:r>
-              <a:rPr lang="en-US" sz="2000" dirty="0"/>
-              <a:t>AL/AX </a:t>
-            </a:r>
-            <a:r>
-              <a:rPr lang="ru-RU" sz="2000" dirty="0"/>
-              <a:t>без перезаписи </a:t>
-            </a:r>
-            <a:r>
-              <a:rPr lang="en-US" sz="2000" dirty="0"/>
-              <a:t>RAX</a:t>
-            </a:r>
-            <a:r>
-              <a:rPr lang="ru-RU" sz="2000" dirty="0"/>
-              <a:t>) -</a:t>
+              <a:t>безымянных регистров.</a:t>
             </a:r>
             <a:r>
               <a:rPr lang="en-US" sz="2000" dirty="0"/>
@@ -14832,21 +14864,144 @@
             </a:r>
             <a:r>
               <a:rPr lang="ru-RU" sz="2000" dirty="0"/>
-              <a:t>ЦП не может понять, что данные в старшей части регистра не нужны, и разорвать зависимость.</a:t>
+              <a:t>При разрыве зависимости ЦП выбирает один из аппаратных регистров и начинает использовать его. При этом, одновременно 2 аппаратных регистра могут иметь одно «имя».</a:t>
             </a:r>
           </a:p>
           <a:p>
             <a:pPr marL="0" indent="0">
               <a:buNone/>
             </a:pPr>
-            <a:endParaRPr lang="en-US" sz="2000" dirty="0"/>
+            <a:r>
+              <a:rPr lang="ru-RU" sz="2000" dirty="0"/>
+              <a:t>При полной перезаписи </a:t>
+            </a:r>
+            <a:r>
+              <a:rPr lang="ru-RU" sz="2000" i="1" dirty="0"/>
+              <a:t>всего</a:t>
+            </a:r>
+            <a:r>
+              <a:rPr lang="ru-RU" sz="2000" dirty="0"/>
+              <a:t> регистра инструкциями </a:t>
+            </a:r>
+            <a:r>
+              <a:rPr lang="en-US" sz="2000" dirty="0">
+                <a:latin typeface="Courier New" panose="02070309020205020404" pitchFamily="49" charset="0"/>
+                <a:cs typeface="Courier New" panose="02070309020205020404" pitchFamily="49" charset="0"/>
+              </a:rPr>
+              <a:t>MOV(SX/ZX)</a:t>
+            </a:r>
+            <a:r>
+              <a:rPr lang="en-US" sz="2000" dirty="0"/>
+              <a:t>, </a:t>
+            </a:r>
+            <a:r>
+              <a:rPr lang="en-US" sz="2000" dirty="0">
+                <a:latin typeface="Courier New" panose="02070309020205020404" pitchFamily="49" charset="0"/>
+                <a:cs typeface="Courier New" panose="02070309020205020404" pitchFamily="49" charset="0"/>
+              </a:rPr>
+              <a:t>XOR</a:t>
+            </a:r>
+            <a:r>
+              <a:rPr lang="en-US" sz="2000" dirty="0"/>
+              <a:t> (</a:t>
+            </a:r>
+            <a:r>
+              <a:rPr lang="ru-RU" sz="2000" dirty="0"/>
+              <a:t>регистры общего назначения</a:t>
+            </a:r>
+            <a:r>
+              <a:rPr lang="en-US" sz="2000" dirty="0"/>
+              <a:t>), </a:t>
+            </a:r>
+            <a:r>
+              <a:rPr lang="en-US" sz="2000" dirty="0">
+                <a:latin typeface="Courier New" panose="02070309020205020404" pitchFamily="49" charset="0"/>
+                <a:cs typeface="Courier New" panose="02070309020205020404" pitchFamily="49" charset="0"/>
+              </a:rPr>
+              <a:t>MOVP*/VMOVP*</a:t>
+            </a:r>
+            <a:r>
+              <a:rPr lang="en-US" sz="2000" dirty="0"/>
+              <a:t>, </a:t>
+            </a:r>
+            <a:r>
+              <a:rPr lang="en-US" sz="2000" dirty="0">
+                <a:latin typeface="Courier New" panose="02070309020205020404" pitchFamily="49" charset="0"/>
+                <a:cs typeface="Courier New" panose="02070309020205020404" pitchFamily="49" charset="0"/>
+              </a:rPr>
+              <a:t>PXOR</a:t>
+            </a:r>
+            <a:r>
+              <a:rPr lang="ru-RU" sz="2000" dirty="0">
+                <a:latin typeface="Courier New" panose="02070309020205020404" pitchFamily="49" charset="0"/>
+                <a:cs typeface="Courier New" panose="02070309020205020404" pitchFamily="49" charset="0"/>
+              </a:rPr>
+              <a:t>/</a:t>
+            </a:r>
+            <a:r>
+              <a:rPr lang="en-US" sz="2000" dirty="0">
+                <a:latin typeface="Courier New" panose="02070309020205020404" pitchFamily="49" charset="0"/>
+                <a:cs typeface="Courier New" panose="02070309020205020404" pitchFamily="49" charset="0"/>
+              </a:rPr>
+              <a:t>VPXOR</a:t>
+            </a:r>
+            <a:r>
+              <a:rPr lang="en-US" sz="2000" dirty="0"/>
+              <a:t> (</a:t>
+            </a:r>
+            <a:r>
+              <a:rPr lang="ru-RU" sz="2000" dirty="0"/>
+              <a:t>векторные регистры</a:t>
+            </a:r>
+            <a:r>
+              <a:rPr lang="en-US" sz="2000" dirty="0"/>
+              <a:t>)</a:t>
+            </a:r>
+            <a:r>
+              <a:rPr lang="ru-RU" sz="2000" dirty="0"/>
+              <a:t> на аппаратном уровне ЦП просто выбирает свободный регистр и начинает использовать его. Компиляторы иногда генерируют данные инструкции там, где они вроде-бы не требуются, именно для разрыва зависимостей.</a:t>
+            </a:r>
           </a:p>
           <a:p>
             <a:pPr marL="0" indent="0">
               <a:buNone/>
             </a:pPr>
+            <a:r>
+              <a:rPr lang="ru-RU" sz="2000" dirty="0"/>
+              <a:t>В современных ЦП арифметические флаги регистра </a:t>
+            </a:r>
+            <a:r>
+              <a:rPr lang="en-US" sz="2000" dirty="0"/>
+              <a:t>FLAGS </a:t>
+            </a:r>
+            <a:r>
+              <a:rPr lang="ru-RU" sz="2000" dirty="0"/>
+              <a:t>выносятся в отдельные независимые регистры</a:t>
+            </a:r>
+            <a:r>
+              <a:rPr lang="en-US" sz="2000" dirty="0"/>
+              <a:t> =&gt; </a:t>
+            </a:r>
+            <a:r>
+              <a:rPr lang="ru-RU" sz="2000" dirty="0"/>
+              <a:t>зависимость по регистру </a:t>
+            </a:r>
+            <a:r>
+              <a:rPr lang="en-US" sz="2000" dirty="0"/>
+              <a:t>FLAGS </a:t>
+            </a:r>
+            <a:r>
+              <a:rPr lang="ru-RU" sz="2000" dirty="0"/>
+              <a:t>обычно отсутствует.</a:t>
+            </a:r>
             <a:endParaRPr lang="en-US" sz="2000" dirty="0"/>
           </a:p>
+          <a:p>
+            <a:pPr marL="0" indent="0">
+              <a:buNone/>
+            </a:pPr>
+            <a:endParaRPr lang="ru-RU" sz="2000" dirty="0"/>
+          </a:p>
         </p:txBody>
       </p:sp>
       <p:sp>
@@ -14854,7 +15009,7 @@
           <p:cNvPr id="5" name="Номер слайда 4">
             <a:extLst>
               <a:ext uri="{FF2B5EF4-FFF2-40B4-BE49-F238E27FC236}">
-                <a16:creationId xmlns:a16="http://schemas.microsoft.com/office/drawing/2014/main" id="{9C1C2D9E-9D8F-9A1E-AF35-9E80B6999602}"/>
+                <a16:creationId xmlns:a16="http://schemas.microsoft.com/office/drawing/2014/main" id="{96C6922B-B0AD-8CEA-24B8-199CFEE9CFDD}"/>
               </a:ext>
             </a:extLst>
           </p:cNvPr>
@@ -14875,16 +15030,16 @@
               <a:pPr/>
               <a:t>21</a:t>
             </a:fld>
-            <a:endParaRPr lang="en-US" dirty="0"/>
-          </a:p>
-        </p:txBody>
-      </p:sp>
-      <p:sp>
-        <p:nvSpPr>
-          <p:cNvPr id="6" name="TextBox 5">
-            <a:extLst>
-              <a:ext uri="{FF2B5EF4-FFF2-40B4-BE49-F238E27FC236}">
-                <a16:creationId xmlns:a16="http://schemas.microsoft.com/office/drawing/2014/main" id="{898F3DA7-ED12-7BBD-BFE2-4E338C99D99A}"/>
+            <a:endParaRPr lang="en-US"/>
+          </a:p>
+        </p:txBody>
+      </p:sp>
+      <p:sp>
+        <p:nvSpPr>
+          <p:cNvPr id="11" name="TextBox 10">
+            <a:extLst>
+              <a:ext uri="{FF2B5EF4-FFF2-40B4-BE49-F238E27FC236}">
+                <a16:creationId xmlns:a16="http://schemas.microsoft.com/office/drawing/2014/main" id="{A84B3C6E-B291-6348-8769-B8EA7235602A}"/>
               </a:ext>
             </a:extLst>
           </p:cNvPr>
@@ -14893,8 +15048,8 @@
         </p:nvSpPr>
         <p:spPr>
           <a:xfrm>
-            <a:off x="264443" y="5630100"/>
-            <a:ext cx="6200151" cy="923330"/>
+            <a:off x="175800" y="5209175"/>
+            <a:ext cx="6447634" cy="1477328"/>
           </a:xfrm>
           <a:prstGeom prst="rect">
             <a:avLst/>
@@ -14902,217 +15057,17 @@
           <a:noFill/>
         </p:spPr>
         <p:txBody>
-          <a:bodyPr wrap="square">
+          <a:bodyPr wrap="square" rtlCol="0">
             <a:spAutoFit/>
           </a:bodyPr>
           <a:lstStyle/>
           <a:p>
-            <a:pPr marL="0" indent="0">
-              <a:buNone/>
-            </a:pPr>
-            <a:r>
-              <a:rPr lang="en-US" sz="1800" dirty="0">
-                <a:latin typeface="Courier New" panose="02070309020205020404" pitchFamily="49" charset="0"/>
-                <a:cs typeface="Courier New" panose="02070309020205020404" pitchFamily="49" charset="0"/>
-              </a:rPr>
-              <a:t>ADD EDX, 1</a:t>
-            </a:r>
-            <a:br>
-              <a:rPr lang="en-US" sz="1800" dirty="0">
-                <a:latin typeface="Courier New" panose="02070309020205020404" pitchFamily="49" charset="0"/>
-                <a:cs typeface="Courier New" panose="02070309020205020404" pitchFamily="49" charset="0"/>
-              </a:rPr>
-            </a:br>
-            <a:r>
-              <a:rPr lang="en-US" sz="1800" dirty="0">
-                <a:latin typeface="Courier New" panose="02070309020205020404" pitchFamily="49" charset="0"/>
-                <a:cs typeface="Courier New" panose="02070309020205020404" pitchFamily="49" charset="0"/>
-              </a:rPr>
-              <a:t>INC ECX</a:t>
-            </a:r>
-            <a:r>
-              <a:rPr lang="ru-RU" sz="1800" dirty="0">
-                <a:latin typeface="Courier New" panose="02070309020205020404" pitchFamily="49" charset="0"/>
-                <a:cs typeface="Courier New" panose="02070309020205020404" pitchFamily="49" charset="0"/>
-              </a:rPr>
-              <a:t>    </a:t>
-            </a:r>
-            <a:r>
-              <a:rPr lang="en-US" sz="1800" dirty="0">
-                <a:latin typeface="Courier New" panose="02070309020205020404" pitchFamily="49" charset="0"/>
-                <a:cs typeface="Courier New" panose="02070309020205020404" pitchFamily="49" charset="0"/>
-              </a:rPr>
-              <a:t>; FLAGS </a:t>
-            </a:r>
-            <a:r>
-              <a:rPr lang="ru-RU" sz="1800" dirty="0">
-                <a:latin typeface="Courier New" panose="02070309020205020404" pitchFamily="49" charset="0"/>
-                <a:cs typeface="Courier New" panose="02070309020205020404" pitchFamily="49" charset="0"/>
-              </a:rPr>
-              <a:t>перезаписан частично</a:t>
-            </a:r>
-            <a:r>
-              <a:rPr lang="en-US" sz="1800" dirty="0">
-                <a:latin typeface="Courier New" panose="02070309020205020404" pitchFamily="49" charset="0"/>
-                <a:cs typeface="Courier New" panose="02070309020205020404" pitchFamily="49" charset="0"/>
-              </a:rPr>
-              <a:t> </a:t>
-            </a:r>
-          </a:p>
-          <a:p>
-            <a:pPr marL="0" indent="0">
-              <a:buNone/>
-            </a:pPr>
-            <a:endParaRPr lang="en-US" sz="1800" dirty="0">
-              <a:latin typeface="Courier New" panose="02070309020205020404" pitchFamily="49" charset="0"/>
-              <a:cs typeface="Courier New" panose="02070309020205020404" pitchFamily="49" charset="0"/>
-            </a:endParaRPr>
-          </a:p>
-        </p:txBody>
-      </p:sp>
-      <p:sp>
-        <p:nvSpPr>
-          <p:cNvPr id="7" name="TextBox 6">
-            <a:extLst>
-              <a:ext uri="{FF2B5EF4-FFF2-40B4-BE49-F238E27FC236}">
-                <a16:creationId xmlns:a16="http://schemas.microsoft.com/office/drawing/2014/main" id="{7AF06B05-D386-D9A5-D2A9-63A6D4023EE0}"/>
-              </a:ext>
-            </a:extLst>
-          </p:cNvPr>
-          <p:cNvSpPr txBox="1"/>
-          <p:nvPr/>
-        </p:nvSpPr>
-        <p:spPr>
-          <a:xfrm>
-            <a:off x="264444" y="4195257"/>
-            <a:ext cx="5700017" cy="923330"/>
-          </a:xfrm>
-          <a:prstGeom prst="rect">
-            <a:avLst/>
-          </a:prstGeom>
-          <a:noFill/>
-        </p:spPr>
-        <p:txBody>
-          <a:bodyPr wrap="square">
-            <a:spAutoFit/>
-          </a:bodyPr>
-          <a:lstStyle/>
-          <a:p>
-            <a:pPr marL="0" indent="0">
-              <a:buNone/>
-            </a:pPr>
             <a:r>
               <a:rPr lang="en-US" dirty="0">
                 <a:latin typeface="Courier New" panose="02070309020205020404" pitchFamily="49" charset="0"/>
                 <a:cs typeface="Courier New" panose="02070309020205020404" pitchFamily="49" charset="0"/>
               </a:rPr>
-              <a:t>MOV EDX, EAX</a:t>
-            </a:r>
-          </a:p>
-          <a:p>
-            <a:pPr marL="0" indent="0">
-              <a:buNone/>
-            </a:pPr>
-            <a:r>
-              <a:rPr lang="en-US" dirty="0">
-                <a:latin typeface="Courier New" panose="02070309020205020404" pitchFamily="49" charset="0"/>
-                <a:cs typeface="Courier New" panose="02070309020205020404" pitchFamily="49" charset="0"/>
-              </a:rPr>
-              <a:t>MOV AL, CL</a:t>
-            </a:r>
-            <a:r>
-              <a:rPr lang="ru-RU" dirty="0">
-                <a:latin typeface="Courier New" panose="02070309020205020404" pitchFamily="49" charset="0"/>
-                <a:cs typeface="Courier New" panose="02070309020205020404" pitchFamily="49" charset="0"/>
-              </a:rPr>
-              <a:t>    </a:t>
-            </a:r>
-            <a:r>
-              <a:rPr lang="en-US" dirty="0">
-                <a:latin typeface="Courier New" panose="02070309020205020404" pitchFamily="49" charset="0"/>
-                <a:cs typeface="Courier New" panose="02070309020205020404" pitchFamily="49" charset="0"/>
-              </a:rPr>
-              <a:t>; RAX </a:t>
-            </a:r>
-            <a:r>
-              <a:rPr lang="ru-RU" dirty="0">
-                <a:latin typeface="Courier New" panose="02070309020205020404" pitchFamily="49" charset="0"/>
-                <a:cs typeface="Courier New" panose="02070309020205020404" pitchFamily="49" charset="0"/>
-              </a:rPr>
-              <a:t>перезаписан частично</a:t>
-            </a:r>
-            <a:endParaRPr lang="en-US" dirty="0">
-              <a:latin typeface="Courier New" panose="02070309020205020404" pitchFamily="49" charset="0"/>
-              <a:cs typeface="Courier New" panose="02070309020205020404" pitchFamily="49" charset="0"/>
-            </a:endParaRPr>
-          </a:p>
-          <a:p>
-            <a:pPr marL="0" indent="0">
-              <a:buNone/>
-            </a:pPr>
-            <a:r>
-              <a:rPr lang="en-US" dirty="0">
-                <a:latin typeface="Courier New" panose="02070309020205020404" pitchFamily="49" charset="0"/>
-                <a:cs typeface="Courier New" panose="02070309020205020404" pitchFamily="49" charset="0"/>
-              </a:rPr>
-              <a:t>ADD AL, 3</a:t>
-            </a:r>
-            <a:endParaRPr lang="en-US" sz="1800" dirty="0">
-              <a:latin typeface="Courier New" panose="02070309020205020404" pitchFamily="49" charset="0"/>
-              <a:cs typeface="Courier New" panose="02070309020205020404" pitchFamily="49" charset="0"/>
-            </a:endParaRPr>
-          </a:p>
-        </p:txBody>
-      </p:sp>
-      <p:sp>
-        <p:nvSpPr>
-          <p:cNvPr id="10" name="TextBox 9">
-            <a:extLst>
-              <a:ext uri="{FF2B5EF4-FFF2-40B4-BE49-F238E27FC236}">
-                <a16:creationId xmlns:a16="http://schemas.microsoft.com/office/drawing/2014/main" id="{6396AC0F-8AA6-CC37-8D94-7BDBD65EFE48}"/>
-              </a:ext>
-            </a:extLst>
-          </p:cNvPr>
-          <p:cNvSpPr txBox="1"/>
-          <p:nvPr/>
-        </p:nvSpPr>
-        <p:spPr>
-          <a:xfrm>
-            <a:off x="6314857" y="4195257"/>
-            <a:ext cx="5877143" cy="923330"/>
-          </a:xfrm>
-          <a:prstGeom prst="rect">
-            <a:avLst/>
-          </a:prstGeom>
-          <a:noFill/>
-        </p:spPr>
-        <p:txBody>
-          <a:bodyPr wrap="square">
-            <a:spAutoFit/>
-          </a:bodyPr>
-          <a:lstStyle/>
-          <a:p>
-            <a:pPr marL="0" indent="0">
-              <a:buNone/>
-            </a:pPr>
-            <a:r>
-              <a:rPr lang="en-US" dirty="0">
-                <a:latin typeface="Courier New" panose="02070309020205020404" pitchFamily="49" charset="0"/>
-                <a:cs typeface="Courier New" panose="02070309020205020404" pitchFamily="49" charset="0"/>
-              </a:rPr>
-              <a:t>MOV EDX, EAX</a:t>
-            </a:r>
-          </a:p>
-          <a:p>
-            <a:pPr marL="0" indent="0">
-              <a:buNone/>
-            </a:pPr>
-            <a:r>
-              <a:rPr lang="en-US" dirty="0">
-                <a:latin typeface="Courier New" panose="02070309020205020404" pitchFamily="49" charset="0"/>
-                <a:cs typeface="Courier New" panose="02070309020205020404" pitchFamily="49" charset="0"/>
-              </a:rPr>
-              <a:t>MOVZX EAX, CL</a:t>
+              <a:t>DIV RCX        ; 1</a:t>
             </a:r>
             <a:r>
               <a:rPr lang="ru-RU" dirty="0">
@@ -15121,81 +15076,80 @@
               </a:rPr>
               <a:t> </a:t>
             </a:r>
+            <a:endParaRPr lang="en-US" dirty="0">
+              <a:latin typeface="Courier New" panose="02070309020205020404" pitchFamily="49" charset="0"/>
+              <a:cs typeface="Courier New" panose="02070309020205020404" pitchFamily="49" charset="0"/>
+            </a:endParaRPr>
+          </a:p>
+          <a:p>
             <a:r>
               <a:rPr lang="en-US" dirty="0">
                 <a:latin typeface="Courier New" panose="02070309020205020404" pitchFamily="49" charset="0"/>
                 <a:cs typeface="Courier New" panose="02070309020205020404" pitchFamily="49" charset="0"/>
               </a:rPr>
-              <a:t>; RAX </a:t>
+              <a:t>MOV [RDI], RDX ; 1</a:t>
+            </a:r>
+          </a:p>
+          <a:p>
+            <a:r>
+              <a:rPr lang="en-US" dirty="0">
+                <a:latin typeface="Courier New" panose="02070309020205020404" pitchFamily="49" charset="0"/>
+                <a:cs typeface="Courier New" panose="02070309020205020404" pitchFamily="49" charset="0"/>
+              </a:rPr>
+              <a:t>MOV EDX, [RSI] ; 2</a:t>
             </a:r>
             <a:r>
               <a:rPr lang="ru-RU" dirty="0">
                 <a:latin typeface="Courier New" panose="02070309020205020404" pitchFamily="49" charset="0"/>
                 <a:cs typeface="Courier New" panose="02070309020205020404" pitchFamily="49" charset="0"/>
               </a:rPr>
-              <a:t>перезаписан полностью</a:t>
-            </a:r>
-            <a:endParaRPr lang="en-US" dirty="0">
-              <a:latin typeface="Courier New" panose="02070309020205020404" pitchFamily="49" charset="0"/>
-              <a:cs typeface="Courier New" panose="02070309020205020404" pitchFamily="49" charset="0"/>
-            </a:endParaRPr>
-          </a:p>
-          <a:p>
-            <a:pPr marL="0" indent="0">
-              <a:buNone/>
-            </a:pPr>
+              <a:t> (</a:t>
+            </a:r>
             <a:r>
               <a:rPr lang="en-US" dirty="0">
                 <a:latin typeface="Courier New" panose="02070309020205020404" pitchFamily="49" charset="0"/>
                 <a:cs typeface="Courier New" panose="02070309020205020404" pitchFamily="49" charset="0"/>
               </a:rPr>
-              <a:t>ADD AL, 3</a:t>
-            </a:r>
-          </a:p>
-        </p:txBody>
-      </p:sp>
-      <p:cxnSp>
-        <p:nvCxnSpPr>
-          <p:cNvPr id="12" name="Прямая соединительная линия 11">
-            <a:extLst>
-              <a:ext uri="{FF2B5EF4-FFF2-40B4-BE49-F238E27FC236}">
-                <a16:creationId xmlns:a16="http://schemas.microsoft.com/office/drawing/2014/main" id="{B026B008-1A39-C6B6-D731-38E693D1E233}"/>
-              </a:ext>
-            </a:extLst>
-          </p:cNvPr>
-          <p:cNvCxnSpPr/>
-          <p:nvPr/>
-        </p:nvCxnSpPr>
-        <p:spPr>
-          <a:xfrm>
-            <a:off x="6145619" y="4125433"/>
-            <a:ext cx="0" cy="2651051"/>
-          </a:xfrm>
-          <a:prstGeom prst="line">
-            <a:avLst/>
-          </a:prstGeom>
-        </p:spPr>
-        <p:style>
-          <a:lnRef idx="1">
-            <a:schemeClr val="dk1"/>
-          </a:lnRef>
-          <a:fillRef idx="0">
-            <a:schemeClr val="dk1"/>
-          </a:fillRef>
-          <a:effectRef idx="0">
-            <a:schemeClr val="dk1"/>
-          </a:effectRef>
-          <a:fontRef idx="minor">
-            <a:schemeClr val="tx1"/>
-          </a:fontRef>
-        </p:style>
-      </p:cxnSp>
-      <p:sp>
-        <p:nvSpPr>
-          <p:cNvPr id="14" name="TextBox 13">
-            <a:extLst>
-              <a:ext uri="{FF2B5EF4-FFF2-40B4-BE49-F238E27FC236}">
-                <a16:creationId xmlns:a16="http://schemas.microsoft.com/office/drawing/2014/main" id="{C3C1E662-05A7-50E1-D638-B43DDB69A33A}"/>
+              <a:t>RDX </a:t>
+            </a:r>
+            <a:r>
+              <a:rPr lang="ru-RU" dirty="0">
+                <a:latin typeface="Courier New" panose="02070309020205020404" pitchFamily="49" charset="0"/>
+                <a:cs typeface="Courier New" panose="02070309020205020404" pitchFamily="49" charset="0"/>
+              </a:rPr>
+              <a:t>перезаписан)</a:t>
+            </a:r>
+            <a:r>
+              <a:rPr lang="en-US" dirty="0">
+                <a:latin typeface="Courier New" panose="02070309020205020404" pitchFamily="49" charset="0"/>
+                <a:cs typeface="Courier New" panose="02070309020205020404" pitchFamily="49" charset="0"/>
+              </a:rPr>
+              <a:t> </a:t>
+            </a:r>
+          </a:p>
+          <a:p>
+            <a:r>
+              <a:rPr lang="en-US" dirty="0">
+                <a:latin typeface="Courier New" panose="02070309020205020404" pitchFamily="49" charset="0"/>
+                <a:cs typeface="Courier New" panose="02070309020205020404" pitchFamily="49" charset="0"/>
+              </a:rPr>
+              <a:t>ADD EDX, 10    ; 2</a:t>
+            </a:r>
+          </a:p>
+          <a:p>
+            <a:endParaRPr lang="ru-RU" dirty="0">
+              <a:latin typeface="Courier New" panose="02070309020205020404" pitchFamily="49" charset="0"/>
+              <a:cs typeface="Courier New" panose="02070309020205020404" pitchFamily="49" charset="0"/>
+            </a:endParaRPr>
+          </a:p>
+        </p:txBody>
+      </p:sp>
+      <p:sp>
+        <p:nvSpPr>
+          <p:cNvPr id="4" name="TextBox 3">
+            <a:extLst>
+              <a:ext uri="{FF2B5EF4-FFF2-40B4-BE49-F238E27FC236}">
+                <a16:creationId xmlns:a16="http://schemas.microsoft.com/office/drawing/2014/main" id="{9039AE5F-AEEE-FF6A-782D-EE6EFEDB8491}"/>
               </a:ext>
             </a:extLst>
           </p:cNvPr>
@@ -15204,8 +15158,8 @@
         </p:nvSpPr>
         <p:spPr>
           <a:xfrm>
-            <a:off x="6314857" y="5630100"/>
-            <a:ext cx="5877143" cy="646331"/>
+            <a:off x="5633964" y="5209175"/>
+            <a:ext cx="6634836" cy="1200329"/>
           </a:xfrm>
           <a:prstGeom prst="rect">
             <a:avLst/>
@@ -15213,66 +15167,117 @@
           <a:noFill/>
         </p:spPr>
         <p:txBody>
-          <a:bodyPr wrap="square">
+          <a:bodyPr wrap="square" rtlCol="0">
             <a:spAutoFit/>
           </a:bodyPr>
           <a:lstStyle/>
           <a:p>
-            <a:pPr marL="0" indent="0">
-              <a:buNone/>
-            </a:pPr>
-            <a:r>
-              <a:rPr lang="en-US" sz="1800" dirty="0">
+            <a:r>
+              <a:rPr lang="en-US" dirty="0">
                 <a:latin typeface="Courier New" panose="02070309020205020404" pitchFamily="49" charset="0"/>
                 <a:cs typeface="Courier New" panose="02070309020205020404" pitchFamily="49" charset="0"/>
               </a:rPr>
-              <a:t>ADD EDX, 1</a:t>
-            </a:r>
-            <a:br>
-              <a:rPr lang="en-US" sz="1800" dirty="0">
-                <a:latin typeface="Courier New" panose="02070309020205020404" pitchFamily="49" charset="0"/>
-                <a:cs typeface="Courier New" panose="02070309020205020404" pitchFamily="49" charset="0"/>
-              </a:rPr>
-            </a:br>
-            <a:r>
-              <a:rPr lang="en-US" sz="1800" dirty="0">
-                <a:latin typeface="Courier New" panose="02070309020205020404" pitchFamily="49" charset="0"/>
-                <a:cs typeface="Courier New" panose="02070309020205020404" pitchFamily="49" charset="0"/>
-              </a:rPr>
-              <a:t>ADD EXC, 1</a:t>
-            </a:r>
-            <a:r>
-              <a:rPr lang="ru-RU" sz="1800" dirty="0">
+              <a:t>MOVPS XMM1, XMM0</a:t>
+            </a:r>
+            <a:r>
+              <a:rPr lang="ru-RU" dirty="0">
                 <a:latin typeface="Courier New" panose="02070309020205020404" pitchFamily="49" charset="0"/>
                 <a:cs typeface="Courier New" panose="02070309020205020404" pitchFamily="49" charset="0"/>
               </a:rPr>
               <a:t> </a:t>
             </a:r>
             <a:r>
-              <a:rPr lang="en-US" sz="1800" dirty="0">
+              <a:rPr lang="en-US" dirty="0">
                 <a:latin typeface="Courier New" panose="02070309020205020404" pitchFamily="49" charset="0"/>
                 <a:cs typeface="Courier New" panose="02070309020205020404" pitchFamily="49" charset="0"/>
               </a:rPr>
-              <a:t>; FLAGS </a:t>
-            </a:r>
-            <a:r>
-              <a:rPr lang="ru-RU" sz="1800" dirty="0">
+              <a:t>; 1</a:t>
+            </a:r>
+          </a:p>
+          <a:p>
+            <a:r>
+              <a:rPr lang="en-US" dirty="0">
                 <a:latin typeface="Courier New" panose="02070309020205020404" pitchFamily="49" charset="0"/>
                 <a:cs typeface="Courier New" panose="02070309020205020404" pitchFamily="49" charset="0"/>
               </a:rPr>
-              <a:t>перезаписан полностью</a:t>
-            </a:r>
-            <a:endParaRPr lang="en-US" sz="1800" dirty="0">
+              <a:t>PXOR XMM0, XMM0  ; 2 (XMM0 </a:t>
+            </a:r>
+            <a:r>
+              <a:rPr lang="ru-RU" dirty="0">
+                <a:latin typeface="Courier New" panose="02070309020205020404" pitchFamily="49" charset="0"/>
+                <a:cs typeface="Courier New" panose="02070309020205020404" pitchFamily="49" charset="0"/>
+              </a:rPr>
+              <a:t>перезаписан целиком</a:t>
+            </a:r>
+            <a:r>
+              <a:rPr lang="en-US" dirty="0">
+                <a:latin typeface="Courier New" panose="02070309020205020404" pitchFamily="49" charset="0"/>
+                <a:cs typeface="Courier New" panose="02070309020205020404" pitchFamily="49" charset="0"/>
+              </a:rPr>
+              <a:t>)</a:t>
+            </a:r>
+          </a:p>
+          <a:p>
+            <a:r>
+              <a:rPr lang="en-US" dirty="0">
+                <a:latin typeface="Courier New" panose="02070309020205020404" pitchFamily="49" charset="0"/>
+                <a:cs typeface="Courier New" panose="02070309020205020404" pitchFamily="49" charset="0"/>
+              </a:rPr>
+              <a:t>MOVSS XMM0, XMM2 ; 2</a:t>
+            </a:r>
+          </a:p>
+          <a:p>
+            <a:endParaRPr lang="ru-RU" dirty="0">
               <a:latin typeface="Courier New" panose="02070309020205020404" pitchFamily="49" charset="0"/>
               <a:cs typeface="Courier New" panose="02070309020205020404" pitchFamily="49" charset="0"/>
             </a:endParaRPr>
           </a:p>
         </p:txBody>
       </p:sp>
+      <p:sp>
+        <p:nvSpPr>
+          <p:cNvPr id="7" name="TextBox 6">
+            <a:extLst>
+              <a:ext uri="{FF2B5EF4-FFF2-40B4-BE49-F238E27FC236}">
+                <a16:creationId xmlns:a16="http://schemas.microsoft.com/office/drawing/2014/main" id="{C10F3CFE-C609-7811-D520-8F3A89B4128D}"/>
+              </a:ext>
+            </a:extLst>
+          </p:cNvPr>
+          <p:cNvSpPr txBox="1"/>
+          <p:nvPr/>
+        </p:nvSpPr>
+        <p:spPr>
+          <a:xfrm>
+            <a:off x="1410586" y="6538912"/>
+            <a:ext cx="3152210" cy="369332"/>
+          </a:xfrm>
+          <a:prstGeom prst="rect">
+            <a:avLst/>
+          </a:prstGeom>
+          <a:noFill/>
+        </p:spPr>
+        <p:txBody>
+          <a:bodyPr wrap="none" rtlCol="0">
+            <a:spAutoFit/>
+          </a:bodyPr>
+          <a:lstStyle/>
+          <a:p>
+            <a:r>
+              <a:rPr lang="ru-RU" dirty="0"/>
+              <a:t>См. также: алгоритм </a:t>
+            </a:r>
+            <a:r>
+              <a:rPr lang="ru-RU" dirty="0" err="1"/>
+              <a:t>Томасуло</a:t>
+            </a:r>
+            <a:endParaRPr lang="ru-RU" dirty="0"/>
+          </a:p>
+        </p:txBody>
+      </p:sp>
     </p:spTree>
     <p:extLst>
       <p:ext uri="{BB962C8B-B14F-4D97-AF65-F5344CB8AC3E}">
-        <p14:creationId xmlns:p14="http://schemas.microsoft.com/office/powerpoint/2010/main" val="3279474797"/>
+        <p14:creationId xmlns:p14="http://schemas.microsoft.com/office/powerpoint/2010/main" val="3607133443"/>
       </p:ext>
     </p:extLst>
   </p:cSld>
@@ -15304,7 +15309,7 @@
           <p:cNvPr id="2" name="Заголовок 1">
             <a:extLst>
               <a:ext uri="{FF2B5EF4-FFF2-40B4-BE49-F238E27FC236}">
-                <a16:creationId xmlns:a16="http://schemas.microsoft.com/office/drawing/2014/main" id="{9A45F6A7-E77F-1454-CA76-42E9CC59AAD6}"/>
+                <a16:creationId xmlns:a16="http://schemas.microsoft.com/office/drawing/2014/main" id="{A70406AD-7D2D-86D5-3079-BA49C57178AF}"/>
               </a:ext>
             </a:extLst>
           </p:cNvPr>
@@ -15315,38 +15320,15 @@
             <p:ph type="title"/>
           </p:nvPr>
         </p:nvSpPr>
-        <p:spPr>
-          <a:xfrm>
-            <a:off x="838200" y="276485"/>
-            <a:ext cx="11430600" cy="1325563"/>
-          </a:xfrm>
-        </p:spPr>
+        <p:spPr/>
         <p:txBody>
           <a:bodyPr/>
           <a:lstStyle/>
           <a:p>
             <a:r>
               <a:rPr lang="ru-RU" dirty="0"/>
-              <a:t>Разрыв зависимостей по данным. Переименование регистров. </a:t>
-            </a:r>
-            <a:r>
-              <a:rPr kumimoji="0" lang="ru-RU" sz="1600" b="0" i="0" u="none" strike="noStrike" kern="1200" cap="none" spc="0" normalizeH="0" baseline="0" noProof="0" dirty="0">
-                <a:ln>
-                  <a:noFill/>
-                </a:ln>
-                <a:solidFill>
-                  <a:prstClr val="black"/>
-                </a:solidFill>
-                <a:effectLst/>
-                <a:uLnTx/>
-                <a:uFillTx/>
-                <a:latin typeface="Calibri Light" panose="020F0302020204030204"/>
-                <a:ea typeface="+mj-ea"/>
-                <a:cs typeface="+mj-cs"/>
-              </a:rPr>
-              <a:t>(пример)</a:t>
-            </a:r>
-            <a:endParaRPr lang="ru-RU" dirty="0"/>
+              <a:t>Ложные зависимости</a:t>
+            </a:r>
           </a:p>
         </p:txBody>
       </p:sp>
@@ -15355,7 +15337,7 @@
           <p:cNvPr id="3" name="Объект 2">
             <a:extLst>
               <a:ext uri="{FF2B5EF4-FFF2-40B4-BE49-F238E27FC236}">
-                <a16:creationId xmlns:a16="http://schemas.microsoft.com/office/drawing/2014/main" id="{3386D23F-1D1C-9972-A5D4-20308CC48FE1}"/>
+                <a16:creationId xmlns:a16="http://schemas.microsoft.com/office/drawing/2014/main" id="{BC0D2D4A-9A20-FA69-D8EA-4CADBD5A82BB}"/>
               </a:ext>
             </a:extLst>
           </p:cNvPr>
@@ -15366,12 +15348,7 @@
             <p:ph idx="1"/>
           </p:nvPr>
         </p:nvSpPr>
-        <p:spPr>
-          <a:xfrm>
-            <a:off x="838200" y="1602048"/>
-            <a:ext cx="10768200" cy="3985152"/>
-          </a:xfrm>
-        </p:spPr>
+        <p:spPr/>
         <p:txBody>
           <a:bodyPr>
             <a:normAutofit/>
@@ -15383,93 +15360,7 @@
             </a:pPr>
             <a:r>
               <a:rPr lang="ru-RU" sz="2000" dirty="0"/>
-              <a:t>Зависимость по регистру разрывается при полной перезаписи </a:t>
-            </a:r>
-            <a:r>
-              <a:rPr lang="ru-RU" sz="2000" i="1" dirty="0"/>
-              <a:t>всего</a:t>
-            </a:r>
-            <a:r>
-              <a:rPr lang="ru-RU" sz="2000" dirty="0"/>
-              <a:t> регистра инструкциями </a:t>
-            </a:r>
-            <a:r>
-              <a:rPr lang="en-US" sz="2000" dirty="0">
-                <a:latin typeface="Courier New" panose="02070309020205020404" pitchFamily="49" charset="0"/>
-                <a:cs typeface="Courier New" panose="02070309020205020404" pitchFamily="49" charset="0"/>
-              </a:rPr>
-              <a:t>MOV(SX/ZX)</a:t>
-            </a:r>
-            <a:r>
-              <a:rPr lang="en-US" sz="2000" dirty="0"/>
-              <a:t>, </a:t>
-            </a:r>
-            <a:r>
-              <a:rPr lang="en-US" sz="2000" dirty="0">
-                <a:latin typeface="Courier New" panose="02070309020205020404" pitchFamily="49" charset="0"/>
-                <a:cs typeface="Courier New" panose="02070309020205020404" pitchFamily="49" charset="0"/>
-              </a:rPr>
-              <a:t>XOR</a:t>
-            </a:r>
-            <a:r>
-              <a:rPr lang="en-US" sz="2000" dirty="0"/>
-              <a:t> (</a:t>
-            </a:r>
-            <a:r>
-              <a:rPr lang="ru-RU" sz="2000" dirty="0"/>
-              <a:t>регистры общего назначения</a:t>
-            </a:r>
-            <a:r>
-              <a:rPr lang="en-US" sz="2000" dirty="0"/>
-              <a:t>), </a:t>
-            </a:r>
-            <a:r>
-              <a:rPr lang="en-US" sz="2000" dirty="0">
-                <a:latin typeface="Courier New" panose="02070309020205020404" pitchFamily="49" charset="0"/>
-                <a:cs typeface="Courier New" panose="02070309020205020404" pitchFamily="49" charset="0"/>
-              </a:rPr>
-              <a:t>MOVP*/VMOVP*</a:t>
-            </a:r>
-            <a:r>
-              <a:rPr lang="en-US" sz="2000" dirty="0"/>
-              <a:t>, </a:t>
-            </a:r>
-            <a:r>
-              <a:rPr lang="en-US" sz="2000" dirty="0">
-                <a:latin typeface="Courier New" panose="02070309020205020404" pitchFamily="49" charset="0"/>
-                <a:cs typeface="Courier New" panose="02070309020205020404" pitchFamily="49" charset="0"/>
-              </a:rPr>
-              <a:t>PXOR</a:t>
-            </a:r>
-            <a:r>
-              <a:rPr lang="ru-RU" sz="2000" dirty="0">
-                <a:latin typeface="Courier New" panose="02070309020205020404" pitchFamily="49" charset="0"/>
-                <a:cs typeface="Courier New" panose="02070309020205020404" pitchFamily="49" charset="0"/>
-              </a:rPr>
-              <a:t>/</a:t>
-            </a:r>
-            <a:r>
-              <a:rPr lang="en-US" sz="2000" dirty="0">
-                <a:latin typeface="Courier New" panose="02070309020205020404" pitchFamily="49" charset="0"/>
-                <a:cs typeface="Courier New" panose="02070309020205020404" pitchFamily="49" charset="0"/>
-              </a:rPr>
-              <a:t>VPXOR</a:t>
-            </a:r>
-            <a:r>
-              <a:rPr lang="en-US" sz="2000" dirty="0"/>
-              <a:t> (</a:t>
-            </a:r>
-            <a:r>
-              <a:rPr lang="ru-RU" sz="2000" dirty="0"/>
-              <a:t>векторные регистры</a:t>
-            </a:r>
-            <a:r>
-              <a:rPr lang="en-US" sz="2000" dirty="0"/>
-              <a:t>)</a:t>
-            </a:r>
-            <a:r>
-              <a:rPr lang="ru-RU" sz="2000" dirty="0"/>
-              <a:t>. Компиляторы иногда генерируют данные инструкции там, где они вроде-бы не требуются, именно для разрыва зависимостей.</a:t>
+              <a:t>В некоторых случаях зависимость, существующая с точки зрения ЦП, в реальности не влияет на исход работы программы.</a:t>
             </a:r>
           </a:p>
           <a:p>
@@ -15478,103 +15369,61 @@
             </a:pPr>
             <a:r>
               <a:rPr lang="ru-RU" sz="2000" dirty="0"/>
-              <a:t>Для увеличения производительности  используется механизм </a:t>
-            </a:r>
-            <a:r>
-              <a:rPr lang="ru-RU" sz="2000" b="1" dirty="0"/>
-              <a:t>переименования регистров</a:t>
+              <a:t>Причиной ложных зависимостей является работа с частью регистра без перезаписи всего регистра (например, выполнение скалярных операций </a:t>
+            </a:r>
+            <a:r>
+              <a:rPr lang="en-US" sz="2000" dirty="0"/>
+              <a:t>SSE </a:t>
             </a:r>
             <a:r>
               <a:rPr lang="ru-RU" sz="2000" dirty="0"/>
-              <a:t>, который позволяет избавиться от </a:t>
-            </a:r>
-            <a:r>
-              <a:rPr lang="en-US" sz="2000" dirty="0" err="1"/>
-              <a:t>WaR</a:t>
+              <a:t>без предшествующего </a:t>
             </a:r>
             <a:r>
               <a:rPr lang="en-US" sz="2000" dirty="0"/>
-              <a:t>/</a:t>
-            </a:r>
-            <a:r>
-              <a:rPr lang="en-US" sz="2000" dirty="0" err="1"/>
-              <a:t>WaW</a:t>
+              <a:t>PXOR </a:t>
+            </a:r>
+            <a:r>
+              <a:rPr lang="ru-RU" sz="2000" dirty="0"/>
+              <a:t>или работа с </a:t>
             </a:r>
             <a:r>
               <a:rPr lang="en-US" sz="2000" dirty="0"/>
-              <a:t>-</a:t>
+              <a:t>AL/AX </a:t>
             </a:r>
             <a:r>
               <a:rPr lang="ru-RU" sz="2000" dirty="0"/>
-              <a:t>зависимостей.</a:t>
-            </a:r>
-            <a:endParaRPr lang="en-US" sz="2000" dirty="0"/>
+              <a:t>без перезаписи </a:t>
+            </a:r>
+            <a:r>
+              <a:rPr lang="en-US" sz="2000" dirty="0"/>
+              <a:t>RAX</a:t>
+            </a:r>
+            <a:r>
+              <a:rPr lang="ru-RU" sz="2000" dirty="0"/>
+              <a:t>) -</a:t>
+            </a:r>
+            <a:r>
+              <a:rPr lang="en-US" sz="2000" dirty="0"/>
+              <a:t> </a:t>
+            </a:r>
+            <a:r>
+              <a:rPr lang="ru-RU" sz="2000" dirty="0"/>
+              <a:t>ЦП не может понять, что данные в старшей части регистра не нужны, и разорвать зависимость.</a:t>
+            </a:r>
           </a:p>
           <a:p>
             <a:pPr marL="0" indent="0">
               <a:buNone/>
             </a:pPr>
-            <a:r>
-              <a:rPr lang="ru-RU" sz="2000" dirty="0"/>
-              <a:t>На аппаратном уровне в регистровом файле есть </a:t>
-            </a:r>
-            <a:r>
-              <a:rPr lang="en-US" sz="2000" dirty="0"/>
-              <a:t>&gt;100 </a:t>
-            </a:r>
-            <a:r>
-              <a:rPr lang="ru-RU" sz="2000" dirty="0"/>
-              <a:t>безымянных регистров.</a:t>
-            </a:r>
-            <a:r>
-              <a:rPr lang="en-US" sz="2000" dirty="0"/>
-              <a:t> </a:t>
-            </a:r>
-            <a:r>
-              <a:rPr lang="ru-RU" sz="2000" dirty="0"/>
-              <a:t>При разрыве зависимости ЦП выбирает один из аппаратных регистров и начинает использовать его. При этом, одновременно 2 аппаратных регистра могут иметь одно «имя».</a:t>
-            </a:r>
+            <a:endParaRPr lang="en-US" sz="2000" dirty="0"/>
           </a:p>
           <a:p>
             <a:pPr marL="0" indent="0">
               <a:buNone/>
             </a:pPr>
-            <a:r>
-              <a:rPr lang="ru-RU" sz="2000" dirty="0"/>
-              <a:t>В современных ЦП арифметические флаги регистра </a:t>
-            </a:r>
-            <a:r>
-              <a:rPr lang="en-US" sz="2000" dirty="0"/>
-              <a:t>FLAGS </a:t>
-            </a:r>
-            <a:r>
-              <a:rPr lang="ru-RU" sz="2000" dirty="0"/>
-              <a:t>выносятся в отдельные независимые регистры</a:t>
-            </a:r>
-            <a:r>
-              <a:rPr lang="en-US" sz="2000" dirty="0"/>
-              <a:t> =&gt; </a:t>
-            </a:r>
-            <a:r>
-              <a:rPr lang="ru-RU" sz="2000" dirty="0"/>
-              <a:t>зависимость по регистру </a:t>
-            </a:r>
-            <a:r>
-              <a:rPr lang="en-US" sz="2000" dirty="0"/>
-              <a:t>FLAGS </a:t>
-            </a:r>
-            <a:r>
-              <a:rPr lang="ru-RU" sz="2000" dirty="0"/>
-              <a:t>обычно отсутствует.</a:t>
-            </a:r>
             <a:endParaRPr lang="en-US" sz="2000" dirty="0"/>
           </a:p>
-          <a:p>
-            <a:pPr marL="0" indent="0">
-              <a:buNone/>
-            </a:pPr>
-            <a:endParaRPr lang="ru-RU" sz="2000" dirty="0"/>
-          </a:p>
         </p:txBody>
       </p:sp>
       <p:sp>
@@ -15582,7 +15431,7 @@
           <p:cNvPr id="5" name="Номер слайда 4">
             <a:extLst>
               <a:ext uri="{FF2B5EF4-FFF2-40B4-BE49-F238E27FC236}">
-                <a16:creationId xmlns:a16="http://schemas.microsoft.com/office/drawing/2014/main" id="{96C6922B-B0AD-8CEA-24B8-199CFEE9CFDD}"/>
+                <a16:creationId xmlns:a16="http://schemas.microsoft.com/office/drawing/2014/main" id="{9C1C2D9E-9D8F-9A1E-AF35-9E80B6999602}"/>
               </a:ext>
             </a:extLst>
           </p:cNvPr>
@@ -15603,16 +15452,16 @@
               <a:pPr/>
               <a:t>22</a:t>
             </a:fld>
-            <a:endParaRPr lang="en-US"/>
-          </a:p>
-        </p:txBody>
-      </p:sp>
-      <p:sp>
-        <p:nvSpPr>
-          <p:cNvPr id="11" name="TextBox 10">
-            <a:extLst>
-              <a:ext uri="{FF2B5EF4-FFF2-40B4-BE49-F238E27FC236}">
-                <a16:creationId xmlns:a16="http://schemas.microsoft.com/office/drawing/2014/main" id="{A84B3C6E-B291-6348-8769-B8EA7235602A}"/>
+            <a:endParaRPr lang="en-US" dirty="0"/>
+          </a:p>
+        </p:txBody>
+      </p:sp>
+      <p:sp>
+        <p:nvSpPr>
+          <p:cNvPr id="6" name="TextBox 5">
+            <a:extLst>
+              <a:ext uri="{FF2B5EF4-FFF2-40B4-BE49-F238E27FC236}">
+                <a16:creationId xmlns:a16="http://schemas.microsoft.com/office/drawing/2014/main" id="{898F3DA7-ED12-7BBD-BFE2-4E338C99D99A}"/>
               </a:ext>
             </a:extLst>
           </p:cNvPr>
@@ -15621,8 +15470,8 @@
         </p:nvSpPr>
         <p:spPr>
           <a:xfrm>
-            <a:off x="175800" y="5135824"/>
-            <a:ext cx="6447634" cy="1477328"/>
+            <a:off x="264443" y="5630100"/>
+            <a:ext cx="6200151" cy="923330"/>
           </a:xfrm>
           <a:prstGeom prst="rect">
             <a:avLst/>
@@ -15630,17 +15479,217 @@
           <a:noFill/>
         </p:spPr>
         <p:txBody>
-          <a:bodyPr wrap="square" rtlCol="0">
+          <a:bodyPr wrap="square">
             <a:spAutoFit/>
           </a:bodyPr>
           <a:lstStyle/>
           <a:p>
+            <a:pPr marL="0" indent="0">
+              <a:buNone/>
+            </a:pPr>
+            <a:r>
+              <a:rPr lang="en-US" sz="1800" dirty="0">
+                <a:latin typeface="Courier New" panose="02070309020205020404" pitchFamily="49" charset="0"/>
+                <a:cs typeface="Courier New" panose="02070309020205020404" pitchFamily="49" charset="0"/>
+              </a:rPr>
+              <a:t>ADD EDX, 1</a:t>
+            </a:r>
+            <a:br>
+              <a:rPr lang="en-US" sz="1800" dirty="0">
+                <a:latin typeface="Courier New" panose="02070309020205020404" pitchFamily="49" charset="0"/>
+                <a:cs typeface="Courier New" panose="02070309020205020404" pitchFamily="49" charset="0"/>
+              </a:rPr>
+            </a:br>
+            <a:r>
+              <a:rPr lang="en-US" sz="1800" dirty="0">
+                <a:latin typeface="Courier New" panose="02070309020205020404" pitchFamily="49" charset="0"/>
+                <a:cs typeface="Courier New" panose="02070309020205020404" pitchFamily="49" charset="0"/>
+              </a:rPr>
+              <a:t>INC ECX</a:t>
+            </a:r>
+            <a:r>
+              <a:rPr lang="ru-RU" sz="1800" dirty="0">
+                <a:latin typeface="Courier New" panose="02070309020205020404" pitchFamily="49" charset="0"/>
+                <a:cs typeface="Courier New" panose="02070309020205020404" pitchFamily="49" charset="0"/>
+              </a:rPr>
+              <a:t>    </a:t>
+            </a:r>
+            <a:r>
+              <a:rPr lang="en-US" sz="1800" dirty="0">
+                <a:latin typeface="Courier New" panose="02070309020205020404" pitchFamily="49" charset="0"/>
+                <a:cs typeface="Courier New" panose="02070309020205020404" pitchFamily="49" charset="0"/>
+              </a:rPr>
+              <a:t>; FLAGS </a:t>
+            </a:r>
+            <a:r>
+              <a:rPr lang="ru-RU" sz="1800" dirty="0">
+                <a:latin typeface="Courier New" panose="02070309020205020404" pitchFamily="49" charset="0"/>
+                <a:cs typeface="Courier New" panose="02070309020205020404" pitchFamily="49" charset="0"/>
+              </a:rPr>
+              <a:t>перезаписан частично</a:t>
+            </a:r>
+            <a:r>
+              <a:rPr lang="en-US" sz="1800" dirty="0">
+                <a:latin typeface="Courier New" panose="02070309020205020404" pitchFamily="49" charset="0"/>
+                <a:cs typeface="Courier New" panose="02070309020205020404" pitchFamily="49" charset="0"/>
+              </a:rPr>
+              <a:t> </a:t>
+            </a:r>
+          </a:p>
+          <a:p>
+            <a:pPr marL="0" indent="0">
+              <a:buNone/>
+            </a:pPr>
+            <a:endParaRPr lang="en-US" sz="1800" dirty="0">
+              <a:latin typeface="Courier New" panose="02070309020205020404" pitchFamily="49" charset="0"/>
+              <a:cs typeface="Courier New" panose="02070309020205020404" pitchFamily="49" charset="0"/>
+            </a:endParaRPr>
+          </a:p>
+        </p:txBody>
+      </p:sp>
+      <p:sp>
+        <p:nvSpPr>
+          <p:cNvPr id="7" name="TextBox 6">
+            <a:extLst>
+              <a:ext uri="{FF2B5EF4-FFF2-40B4-BE49-F238E27FC236}">
+                <a16:creationId xmlns:a16="http://schemas.microsoft.com/office/drawing/2014/main" id="{7AF06B05-D386-D9A5-D2A9-63A6D4023EE0}"/>
+              </a:ext>
+            </a:extLst>
+          </p:cNvPr>
+          <p:cNvSpPr txBox="1"/>
+          <p:nvPr/>
+        </p:nvSpPr>
+        <p:spPr>
+          <a:xfrm>
+            <a:off x="264444" y="4195257"/>
+            <a:ext cx="5700017" cy="923330"/>
+          </a:xfrm>
+          <a:prstGeom prst="rect">
+            <a:avLst/>
+          </a:prstGeom>
+          <a:noFill/>
+        </p:spPr>
+        <p:txBody>
+          <a:bodyPr wrap="square">
+            <a:spAutoFit/>
+          </a:bodyPr>
+          <a:lstStyle/>
+          <a:p>
+            <a:pPr marL="0" indent="0">
+              <a:buNone/>
+            </a:pPr>
             <a:r>
               <a:rPr lang="en-US" dirty="0">
                 <a:latin typeface="Courier New" panose="02070309020205020404" pitchFamily="49" charset="0"/>
                 <a:cs typeface="Courier New" panose="02070309020205020404" pitchFamily="49" charset="0"/>
               </a:rPr>
-              <a:t>DIV RCX        ; 1</a:t>
+              <a:t>MOV EDX, EAX</a:t>
+            </a:r>
+          </a:p>
+          <a:p>
+            <a:pPr marL="0" indent="0">
+              <a:buNone/>
+            </a:pPr>
+            <a:r>
+              <a:rPr lang="en-US" dirty="0">
+                <a:latin typeface="Courier New" panose="02070309020205020404" pitchFamily="49" charset="0"/>
+                <a:cs typeface="Courier New" panose="02070309020205020404" pitchFamily="49" charset="0"/>
+              </a:rPr>
+              <a:t>MOV AL, CL</a:t>
+            </a:r>
+            <a:r>
+              <a:rPr lang="ru-RU" dirty="0">
+                <a:latin typeface="Courier New" panose="02070309020205020404" pitchFamily="49" charset="0"/>
+                <a:cs typeface="Courier New" panose="02070309020205020404" pitchFamily="49" charset="0"/>
+              </a:rPr>
+              <a:t>    </a:t>
+            </a:r>
+            <a:r>
+              <a:rPr lang="en-US" dirty="0">
+                <a:latin typeface="Courier New" panose="02070309020205020404" pitchFamily="49" charset="0"/>
+                <a:cs typeface="Courier New" panose="02070309020205020404" pitchFamily="49" charset="0"/>
+              </a:rPr>
+              <a:t>; RAX </a:t>
+            </a:r>
+            <a:r>
+              <a:rPr lang="ru-RU" dirty="0">
+                <a:latin typeface="Courier New" panose="02070309020205020404" pitchFamily="49" charset="0"/>
+                <a:cs typeface="Courier New" panose="02070309020205020404" pitchFamily="49" charset="0"/>
+              </a:rPr>
+              <a:t>перезаписан частично</a:t>
+            </a:r>
+            <a:endParaRPr lang="en-US" dirty="0">
+              <a:latin typeface="Courier New" panose="02070309020205020404" pitchFamily="49" charset="0"/>
+              <a:cs typeface="Courier New" panose="02070309020205020404" pitchFamily="49" charset="0"/>
+            </a:endParaRPr>
+          </a:p>
+          <a:p>
+            <a:pPr marL="0" indent="0">
+              <a:buNone/>
+            </a:pPr>
+            <a:r>
+              <a:rPr lang="en-US" dirty="0">
+                <a:latin typeface="Courier New" panose="02070309020205020404" pitchFamily="49" charset="0"/>
+                <a:cs typeface="Courier New" panose="02070309020205020404" pitchFamily="49" charset="0"/>
+              </a:rPr>
+              <a:t>ADD AL, 3</a:t>
+            </a:r>
+            <a:endParaRPr lang="en-US" sz="1800" dirty="0">
+              <a:latin typeface="Courier New" panose="02070309020205020404" pitchFamily="49" charset="0"/>
+              <a:cs typeface="Courier New" panose="02070309020205020404" pitchFamily="49" charset="0"/>
+            </a:endParaRPr>
+          </a:p>
+        </p:txBody>
+      </p:sp>
+      <p:sp>
+        <p:nvSpPr>
+          <p:cNvPr id="10" name="TextBox 9">
+            <a:extLst>
+              <a:ext uri="{FF2B5EF4-FFF2-40B4-BE49-F238E27FC236}">
+                <a16:creationId xmlns:a16="http://schemas.microsoft.com/office/drawing/2014/main" id="{6396AC0F-8AA6-CC37-8D94-7BDBD65EFE48}"/>
+              </a:ext>
+            </a:extLst>
+          </p:cNvPr>
+          <p:cNvSpPr txBox="1"/>
+          <p:nvPr/>
+        </p:nvSpPr>
+        <p:spPr>
+          <a:xfrm>
+            <a:off x="6314857" y="4195257"/>
+            <a:ext cx="5877143" cy="923330"/>
+          </a:xfrm>
+          <a:prstGeom prst="rect">
+            <a:avLst/>
+          </a:prstGeom>
+          <a:noFill/>
+        </p:spPr>
+        <p:txBody>
+          <a:bodyPr wrap="square">
+            <a:spAutoFit/>
+          </a:bodyPr>
+          <a:lstStyle/>
+          <a:p>
+            <a:pPr marL="0" indent="0">
+              <a:buNone/>
+            </a:pPr>
+            <a:r>
+              <a:rPr lang="en-US" dirty="0">
+                <a:latin typeface="Courier New" panose="02070309020205020404" pitchFamily="49" charset="0"/>
+                <a:cs typeface="Courier New" panose="02070309020205020404" pitchFamily="49" charset="0"/>
+              </a:rPr>
+              <a:t>MOV EDX, EAX</a:t>
+            </a:r>
+          </a:p>
+          <a:p>
+            <a:pPr marL="0" indent="0">
+              <a:buNone/>
+            </a:pPr>
+            <a:r>
+              <a:rPr lang="en-US" dirty="0">
+                <a:latin typeface="Courier New" panose="02070309020205020404" pitchFamily="49" charset="0"/>
+                <a:cs typeface="Courier New" panose="02070309020205020404" pitchFamily="49" charset="0"/>
+              </a:rPr>
+              <a:t>MOVZX EAX, CL</a:t>
             </a:r>
             <a:r>
               <a:rPr lang="ru-RU" dirty="0">
@@ -15649,208 +15698,158 @@
               </a:rPr>
               <a:t> </a:t>
             </a:r>
+            <a:r>
+              <a:rPr lang="en-US" dirty="0">
+                <a:latin typeface="Courier New" panose="02070309020205020404" pitchFamily="49" charset="0"/>
+                <a:cs typeface="Courier New" panose="02070309020205020404" pitchFamily="49" charset="0"/>
+              </a:rPr>
+              <a:t>; RAX </a:t>
+            </a:r>
+            <a:r>
+              <a:rPr lang="ru-RU" dirty="0">
+                <a:latin typeface="Courier New" panose="02070309020205020404" pitchFamily="49" charset="0"/>
+                <a:cs typeface="Courier New" panose="02070309020205020404" pitchFamily="49" charset="0"/>
+              </a:rPr>
+              <a:t>перезаписан полностью</a:t>
+            </a:r>
             <a:endParaRPr lang="en-US" dirty="0">
               <a:latin typeface="Courier New" panose="02070309020205020404" pitchFamily="49" charset="0"/>
               <a:cs typeface="Courier New" panose="02070309020205020404" pitchFamily="49" charset="0"/>
             </a:endParaRPr>
           </a:p>
           <a:p>
+            <a:pPr marL="0" indent="0">
+              <a:buNone/>
+            </a:pPr>
             <a:r>
               <a:rPr lang="en-US" dirty="0">
                 <a:latin typeface="Courier New" panose="02070309020205020404" pitchFamily="49" charset="0"/>
                 <a:cs typeface="Courier New" panose="02070309020205020404" pitchFamily="49" charset="0"/>
               </a:rPr>
-              <a:t>MOV [RDI], RDX ; 1</a:t>
-            </a:r>
-          </a:p>
-          <a:p>
-            <a:r>
-              <a:rPr lang="en-US" dirty="0">
+              <a:t>ADD AL, 3</a:t>
+            </a:r>
+          </a:p>
+        </p:txBody>
+      </p:sp>
+      <p:cxnSp>
+        <p:nvCxnSpPr>
+          <p:cNvPr id="12" name="Прямая соединительная линия 11">
+            <a:extLst>
+              <a:ext uri="{FF2B5EF4-FFF2-40B4-BE49-F238E27FC236}">
+                <a16:creationId xmlns:a16="http://schemas.microsoft.com/office/drawing/2014/main" id="{B026B008-1A39-C6B6-D731-38E693D1E233}"/>
+              </a:ext>
+            </a:extLst>
+          </p:cNvPr>
+          <p:cNvCxnSpPr/>
+          <p:nvPr/>
+        </p:nvCxnSpPr>
+        <p:spPr>
+          <a:xfrm>
+            <a:off x="6145619" y="4125433"/>
+            <a:ext cx="0" cy="2651051"/>
+          </a:xfrm>
+          <a:prstGeom prst="line">
+            <a:avLst/>
+          </a:prstGeom>
+        </p:spPr>
+        <p:style>
+          <a:lnRef idx="1">
+            <a:schemeClr val="dk1"/>
+          </a:lnRef>
+          <a:fillRef idx="0">
+            <a:schemeClr val="dk1"/>
+          </a:fillRef>
+          <a:effectRef idx="0">
+            <a:schemeClr val="dk1"/>
+          </a:effectRef>
+          <a:fontRef idx="minor">
+            <a:schemeClr val="tx1"/>
+          </a:fontRef>
+        </p:style>
+      </p:cxnSp>
+      <p:sp>
+        <p:nvSpPr>
+          <p:cNvPr id="14" name="TextBox 13">
+            <a:extLst>
+              <a:ext uri="{FF2B5EF4-FFF2-40B4-BE49-F238E27FC236}">
+                <a16:creationId xmlns:a16="http://schemas.microsoft.com/office/drawing/2014/main" id="{C3C1E662-05A7-50E1-D638-B43DDB69A33A}"/>
+              </a:ext>
+            </a:extLst>
+          </p:cNvPr>
+          <p:cNvSpPr txBox="1"/>
+          <p:nvPr/>
+        </p:nvSpPr>
+        <p:spPr>
+          <a:xfrm>
+            <a:off x="6314857" y="5630100"/>
+            <a:ext cx="5877143" cy="646331"/>
+          </a:xfrm>
+          <a:prstGeom prst="rect">
+            <a:avLst/>
+          </a:prstGeom>
+          <a:noFill/>
+        </p:spPr>
+        <p:txBody>
+          <a:bodyPr wrap="square">
+            <a:spAutoFit/>
+          </a:bodyPr>
+          <a:lstStyle/>
+          <a:p>
+            <a:pPr marL="0" indent="0">
+              <a:buNone/>
+            </a:pPr>
+            <a:r>
+              <a:rPr lang="en-US" sz="1800" dirty="0">
                 <a:latin typeface="Courier New" panose="02070309020205020404" pitchFamily="49" charset="0"/>
                 <a:cs typeface="Courier New" panose="02070309020205020404" pitchFamily="49" charset="0"/>
               </a:rPr>
-              <a:t>MOV EDX, [RSI] ; 2</a:t>
-            </a:r>
-            <a:r>
-              <a:rPr lang="ru-RU" dirty="0">
+              <a:t>ADD EDX, 1</a:t>
+            </a:r>
+            <a:br>
+              <a:rPr lang="en-US" sz="1800" dirty="0">
                 <a:latin typeface="Courier New" panose="02070309020205020404" pitchFamily="49" charset="0"/>
                 <a:cs typeface="Courier New" panose="02070309020205020404" pitchFamily="49" charset="0"/>
               </a:rPr>
-              <a:t> (</a:t>
-            </a:r>
-            <a:r>
-              <a:rPr lang="en-US" dirty="0">
+            </a:br>
+            <a:r>
+              <a:rPr lang="en-US" sz="1800" dirty="0">
                 <a:latin typeface="Courier New" panose="02070309020205020404" pitchFamily="49" charset="0"/>
                 <a:cs typeface="Courier New" panose="02070309020205020404" pitchFamily="49" charset="0"/>
               </a:rPr>
-              <a:t>RDX </a:t>
-            </a:r>
-            <a:r>
-              <a:rPr lang="ru-RU" dirty="0">
-                <a:latin typeface="Courier New" panose="02070309020205020404" pitchFamily="49" charset="0"/>
-                <a:cs typeface="Courier New" panose="02070309020205020404" pitchFamily="49" charset="0"/>
-              </a:rPr>
-              <a:t>перезаписан)</a:t>
-            </a:r>
-            <a:r>
-              <a:rPr lang="en-US" dirty="0">
+              <a:t>ADD EXC, 1</a:t>
+            </a:r>
+            <a:r>
+              <a:rPr lang="ru-RU" sz="1800" dirty="0">
                 <a:latin typeface="Courier New" panose="02070309020205020404" pitchFamily="49" charset="0"/>
                 <a:cs typeface="Courier New" panose="02070309020205020404" pitchFamily="49" charset="0"/>
               </a:rPr>
               <a:t> </a:t>
             </a:r>
-          </a:p>
-          <a:p>
-            <a:r>
-              <a:rPr lang="en-US" dirty="0">
+            <a:r>
+              <a:rPr lang="en-US" sz="1800" dirty="0">
                 <a:latin typeface="Courier New" panose="02070309020205020404" pitchFamily="49" charset="0"/>
                 <a:cs typeface="Courier New" panose="02070309020205020404" pitchFamily="49" charset="0"/>
               </a:rPr>
-              <a:t>ADD EDX, 10    ; 2</a:t>
-            </a:r>
-          </a:p>
-          <a:p>
-            <a:endParaRPr lang="ru-RU" dirty="0">
+              <a:t>; FLAGS </a:t>
+            </a:r>
+            <a:r>
+              <a:rPr lang="ru-RU" sz="1800" dirty="0">
+                <a:latin typeface="Courier New" panose="02070309020205020404" pitchFamily="49" charset="0"/>
+                <a:cs typeface="Courier New" panose="02070309020205020404" pitchFamily="49" charset="0"/>
+              </a:rPr>
+              <a:t>перезаписан полностью</a:t>
+            </a:r>
+            <a:endParaRPr lang="en-US" sz="1800" dirty="0">
               <a:latin typeface="Courier New" panose="02070309020205020404" pitchFamily="49" charset="0"/>
               <a:cs typeface="Courier New" panose="02070309020205020404" pitchFamily="49" charset="0"/>
             </a:endParaRPr>
           </a:p>
         </p:txBody>
       </p:sp>
-      <p:sp>
-        <p:nvSpPr>
-          <p:cNvPr id="4" name="TextBox 3">
-            <a:extLst>
-              <a:ext uri="{FF2B5EF4-FFF2-40B4-BE49-F238E27FC236}">
-                <a16:creationId xmlns:a16="http://schemas.microsoft.com/office/drawing/2014/main" id="{9039AE5F-AEEE-FF6A-782D-EE6EFEDB8491}"/>
-              </a:ext>
-            </a:extLst>
-          </p:cNvPr>
-          <p:cNvSpPr txBox="1"/>
-          <p:nvPr/>
-        </p:nvSpPr>
-        <p:spPr>
-          <a:xfrm>
-            <a:off x="5633964" y="5135824"/>
-            <a:ext cx="6634836" cy="1200329"/>
-          </a:xfrm>
-          <a:prstGeom prst="rect">
-            <a:avLst/>
-          </a:prstGeom>
-          <a:noFill/>
-        </p:spPr>
-        <p:txBody>
-          <a:bodyPr wrap="square" rtlCol="0">
-            <a:spAutoFit/>
-          </a:bodyPr>
-          <a:lstStyle/>
-          <a:p>
-            <a:r>
-              <a:rPr lang="en-US" dirty="0">
-                <a:latin typeface="Courier New" panose="02070309020205020404" pitchFamily="49" charset="0"/>
-                <a:cs typeface="Courier New" panose="02070309020205020404" pitchFamily="49" charset="0"/>
-              </a:rPr>
-              <a:t>MOVPS XMM1, XMM0</a:t>
-            </a:r>
-            <a:r>
-              <a:rPr lang="ru-RU" dirty="0">
-                <a:latin typeface="Courier New" panose="02070309020205020404" pitchFamily="49" charset="0"/>
-                <a:cs typeface="Courier New" panose="02070309020205020404" pitchFamily="49" charset="0"/>
-              </a:rPr>
-              <a:t> </a:t>
-            </a:r>
-            <a:r>
-              <a:rPr lang="en-US" dirty="0">
-                <a:latin typeface="Courier New" panose="02070309020205020404" pitchFamily="49" charset="0"/>
-                <a:cs typeface="Courier New" panose="02070309020205020404" pitchFamily="49" charset="0"/>
-              </a:rPr>
-              <a:t>; 1</a:t>
-            </a:r>
-          </a:p>
-          <a:p>
-            <a:r>
-              <a:rPr lang="en-US" dirty="0">
-                <a:latin typeface="Courier New" panose="02070309020205020404" pitchFamily="49" charset="0"/>
-                <a:cs typeface="Courier New" panose="02070309020205020404" pitchFamily="49" charset="0"/>
-              </a:rPr>
-              <a:t>PXOR XMM0, XMM0  ; 2 (XMM0 </a:t>
-            </a:r>
-            <a:r>
-              <a:rPr lang="ru-RU" dirty="0">
-                <a:latin typeface="Courier New" panose="02070309020205020404" pitchFamily="49" charset="0"/>
-                <a:cs typeface="Courier New" panose="02070309020205020404" pitchFamily="49" charset="0"/>
-              </a:rPr>
-              <a:t>перезаписан целиком</a:t>
-            </a:r>
-            <a:r>
-              <a:rPr lang="en-US" dirty="0">
-                <a:latin typeface="Courier New" panose="02070309020205020404" pitchFamily="49" charset="0"/>
-                <a:cs typeface="Courier New" panose="02070309020205020404" pitchFamily="49" charset="0"/>
-              </a:rPr>
-              <a:t>)</a:t>
-            </a:r>
-          </a:p>
-          <a:p>
-            <a:r>
-              <a:rPr lang="en-US" dirty="0">
-                <a:latin typeface="Courier New" panose="02070309020205020404" pitchFamily="49" charset="0"/>
-                <a:cs typeface="Courier New" panose="02070309020205020404" pitchFamily="49" charset="0"/>
-              </a:rPr>
-              <a:t>MOVSS XMM0, XMM2 ; 2</a:t>
-            </a:r>
-          </a:p>
-          <a:p>
-            <a:endParaRPr lang="ru-RU" dirty="0">
-              <a:latin typeface="Courier New" panose="02070309020205020404" pitchFamily="49" charset="0"/>
-              <a:cs typeface="Courier New" panose="02070309020205020404" pitchFamily="49" charset="0"/>
-            </a:endParaRPr>
-          </a:p>
-        </p:txBody>
-      </p:sp>
-      <p:sp>
-        <p:nvSpPr>
-          <p:cNvPr id="7" name="TextBox 6">
-            <a:extLst>
-              <a:ext uri="{FF2B5EF4-FFF2-40B4-BE49-F238E27FC236}">
-                <a16:creationId xmlns:a16="http://schemas.microsoft.com/office/drawing/2014/main" id="{C10F3CFE-C609-7811-D520-8F3A89B4128D}"/>
-              </a:ext>
-            </a:extLst>
-          </p:cNvPr>
-          <p:cNvSpPr txBox="1"/>
-          <p:nvPr/>
-        </p:nvSpPr>
-        <p:spPr>
-          <a:xfrm>
-            <a:off x="1410586" y="6538912"/>
-            <a:ext cx="3152210" cy="369332"/>
-          </a:xfrm>
-          <a:prstGeom prst="rect">
-            <a:avLst/>
-          </a:prstGeom>
-          <a:noFill/>
-        </p:spPr>
-        <p:txBody>
-          <a:bodyPr wrap="none" rtlCol="0">
-            <a:spAutoFit/>
-          </a:bodyPr>
-          <a:lstStyle/>
-          <a:p>
-            <a:r>
-              <a:rPr lang="ru-RU" dirty="0"/>
-              <a:t>См. также: алгоритм </a:t>
-            </a:r>
-            <a:r>
-              <a:rPr lang="ru-RU" dirty="0" err="1"/>
-              <a:t>Томасуло</a:t>
-            </a:r>
-            <a:endParaRPr lang="ru-RU" dirty="0"/>
-          </a:p>
-        </p:txBody>
-      </p:sp>
     </p:spTree>
     <p:extLst>
       <p:ext uri="{BB962C8B-B14F-4D97-AF65-F5344CB8AC3E}">
-        <p14:creationId xmlns:p14="http://schemas.microsoft.com/office/powerpoint/2010/main" val="3607133443"/>
+        <p14:creationId xmlns:p14="http://schemas.microsoft.com/office/powerpoint/2010/main" val="3279474797"/>
       </p:ext>
     </p:extLst>
   </p:cSld>

</xml_diff>

<commit_message>
[~] Lecture7: changed wording
</commit_message>
<xml_diff>
--- a/Lectures/7.Microarchitecture/Lecture7.pptx
+++ b/Lectures/7.Microarchitecture/Lecture7.pptx
@@ -15975,15 +15975,6 @@
             </a:pPr>
             <a:r>
               <a:rPr lang="ru-RU" sz="2000" dirty="0"/>
-              <a:t>Спекулятивные операции записи сохраняются в очередь, но запись в ОЗУ не производится, пока операция не будет признана действительной.</a:t>
-            </a:r>
-          </a:p>
-          <a:p>
-            <a:pPr marL="0" indent="0">
-              <a:buNone/>
-            </a:pPr>
-            <a:r>
-              <a:rPr lang="ru-RU" sz="2000" dirty="0"/>
               <a:t>Очередь записи может быть источником данных для операций чтения.</a:t>
             </a:r>
           </a:p>
@@ -16676,8 +16667,8 @@
         </p:nvSpPr>
         <p:spPr>
           <a:xfrm>
-            <a:off x="838200" y="1602048"/>
-            <a:ext cx="10768200" cy="4899552"/>
+            <a:off x="493678" y="1618487"/>
+            <a:ext cx="11296245" cy="5255952"/>
           </a:xfrm>
         </p:spPr>
         <p:txBody>
@@ -16685,64 +16676,80 @@
             <a:normAutofit/>
           </a:bodyPr>
           <a:lstStyle/>
+          <a:p>
+            <a:pPr marL="0" indent="0">
+              <a:buNone/>
+            </a:pPr>
+            <a:r>
+              <a:rPr lang="ru-RU" sz="2000" dirty="0"/>
+              <a:t>Условные переходы являются проблемой для архитектур с конвейером, т.к. от результата условного перехода зависит, какие инструкции будут считываться/декодироваться дальше – возникает </a:t>
+            </a:r>
+            <a:r>
+              <a:rPr lang="ru-RU" sz="2000" b="1" dirty="0"/>
+              <a:t>зависимость по управлению</a:t>
+            </a:r>
+            <a:r>
+              <a:rPr lang="ru-RU" sz="2000" dirty="0"/>
+              <a:t>.</a:t>
+            </a:r>
+          </a:p>
+          <a:p>
+            <a:pPr marL="0" indent="0">
+              <a:buNone/>
+            </a:pPr>
+            <a:r>
+              <a:rPr lang="ru-RU" sz="2000" dirty="0"/>
+              <a:t>В этом случае, применима «простая» оптимизация – процессор может  сохранить текущее состояние, предположить исход условного перехода и продолжить выполнение одной из веток (</a:t>
+            </a:r>
+            <a:r>
+              <a:rPr lang="ru-RU" sz="2000" b="1" dirty="0"/>
+              <a:t>спекулятивное выполнение</a:t>
+            </a:r>
+            <a:r>
+              <a:rPr lang="ru-RU" sz="2000" dirty="0"/>
+              <a:t>). В момент, когда результат перехода </a:t>
+            </a:r>
+            <a:r>
+              <a:rPr lang="ru-RU" sz="2000" dirty="0" err="1"/>
+              <a:t>вычислится</a:t>
+            </a:r>
+            <a:r>
+              <a:rPr lang="ru-RU" sz="2000" dirty="0"/>
+              <a:t> окончательно, проверка проводится повторно. Если результат проверки не совпал с предположением, то процессор восстанавливает сохраненное состояние, «откатывая» те изменения, которые он уже сделал.</a:t>
+            </a:r>
+          </a:p>
+          <a:p>
+            <a:pPr marL="0" indent="0" algn="just">
+              <a:buNone/>
+            </a:pPr>
+            <a:r>
+              <a:rPr lang="ru-RU" sz="2000" i="1" dirty="0"/>
+              <a:t>Отсюда следует, что производительность ЦП зависит от того, насколько предсказуемы данные и насколько хорошо ЦП умеет определять закономерности.</a:t>
+            </a:r>
+          </a:p>
+          <a:p>
+            <a:pPr marL="0" indent="0">
+              <a:buNone/>
+            </a:pPr>
+            <a:r>
+              <a:rPr lang="ru-RU" sz="2000" dirty="0"/>
+              <a:t>При спекулятивном выполнении ЦП не может выполнять действия, которые влияют на состояние ЦП и программы в целом. В частности, результаты спекулятивных операций записи сохраняются в очередь записи, но не отправляются в ОЗУ, пока операция не будет признана действительной.</a:t>
+            </a:r>
+          </a:p>
+          <a:p>
+            <a:pPr marL="0" indent="0">
+              <a:buNone/>
+            </a:pPr>
+            <a:r>
+              <a:rPr lang="ru-RU" sz="2000" dirty="0"/>
+              <a:t>Если результатом спекулятивной операции было аппаратное исключение (например, из-за выхода за границы массива/деления на 0), то оно задерживается, пока выполнение исходной инструкции не будет подтверждено</a:t>
+            </a:r>
+          </a:p>
           <a:p>
             <a:pPr marL="0" indent="0">
               <a:buNone/>
             </a:pPr>
             <a:endParaRPr lang="ru-RU" sz="2000" dirty="0"/>
-          </a:p>
-          <a:p>
-            <a:pPr marL="0" indent="0">
-              <a:buNone/>
-            </a:pPr>
-            <a:r>
-              <a:rPr lang="ru-RU" sz="2000" dirty="0"/>
-              <a:t>Производительность памяти является основным ограничивающим фактором с точки зрения производительности. В частности, микрооперации чтения могут порождать длинные цепочки зависимых микроопераций, создающие «заторы» в очереди микроопераций.</a:t>
-            </a:r>
-          </a:p>
-          <a:p>
-            <a:pPr marL="0" indent="0">
-              <a:buNone/>
-            </a:pPr>
-            <a:r>
-              <a:rPr lang="ru-RU" sz="2000" dirty="0"/>
-              <a:t>Пусть результат чтения влияет на результат условного перехода. От условного перехода зависит, какие инструкции будут выполняться дальше – возникает </a:t>
-            </a:r>
-            <a:r>
-              <a:rPr lang="ru-RU" sz="2000" b="1" dirty="0"/>
-              <a:t>зависимость по управлению</a:t>
-            </a:r>
-            <a:r>
-              <a:rPr lang="ru-RU" sz="2000" dirty="0"/>
-              <a:t>.</a:t>
-            </a:r>
-          </a:p>
-          <a:p>
-            <a:pPr marL="0" indent="0">
-              <a:buNone/>
-            </a:pPr>
-            <a:r>
-              <a:rPr lang="ru-RU" sz="2000" dirty="0"/>
-              <a:t>В этом случае, применима «простая» оптимизация – процессор может  сохранить текущее состояние, предположить результат сравнения и продолжить выполнение одной из веток. </a:t>
-            </a:r>
-          </a:p>
-          <a:p>
-            <a:pPr marL="0" indent="0">
-              <a:buNone/>
-            </a:pPr>
-            <a:r>
-              <a:rPr lang="ru-RU" sz="2000" dirty="0"/>
-              <a:t>В момент, когда чтение завершится, проверка проводится повторно. Если результат проверки совпал с предположением, то выполнение продолжается. Если нет – то процессор восстанавливает сохраненное состояние, «откатывая» те изменения, которые он уже сделал.</a:t>
-            </a:r>
-          </a:p>
-          <a:p>
-            <a:pPr marL="0" indent="0">
-              <a:buNone/>
-            </a:pPr>
-            <a:r>
-              <a:rPr lang="ru-RU" sz="2000" i="1" dirty="0"/>
-              <a:t>Отсюда следует, что производительность ЦП зависит от того, насколько предсказуемы данные и насколько хорошо ЦП умеет определять закономерности.</a:t>
-            </a:r>
           </a:p>
         </p:txBody>
       </p:sp>
@@ -16895,8 +16902,40 @@
               <a:t>LFENCE</a:t>
             </a:r>
             <a:r>
+              <a:rPr lang="ru-RU" sz="2000" dirty="0">
+                <a:latin typeface="Courier New" panose="02070309020205020404" pitchFamily="49" charset="0"/>
+                <a:cs typeface="Courier New" panose="02070309020205020404" pitchFamily="49" charset="0"/>
+              </a:rPr>
+              <a:t> на ЦП </a:t>
+            </a:r>
+            <a:r>
+              <a:rPr lang="en-US" sz="2000" dirty="0">
+                <a:latin typeface="Courier New" panose="02070309020205020404" pitchFamily="49" charset="0"/>
+                <a:cs typeface="Courier New" panose="02070309020205020404" pitchFamily="49" charset="0"/>
+              </a:rPr>
+              <a:t>Intel, MFENCE </a:t>
+            </a:r>
+            <a:r>
+              <a:rPr lang="ru-RU" sz="2000" dirty="0">
+                <a:latin typeface="Courier New" panose="02070309020205020404" pitchFamily="49" charset="0"/>
+                <a:cs typeface="Courier New" panose="02070309020205020404" pitchFamily="49" charset="0"/>
+              </a:rPr>
+              <a:t>на ЦП </a:t>
+            </a:r>
+            <a:r>
+              <a:rPr lang="en-US" sz="2000" dirty="0">
+                <a:latin typeface="Courier New" panose="02070309020205020404" pitchFamily="49" charset="0"/>
+                <a:cs typeface="Courier New" panose="02070309020205020404" pitchFamily="49" charset="0"/>
+              </a:rPr>
+              <a:t>AMD</a:t>
+            </a:r>
+            <a:r>
               <a:rPr lang="en-US" sz="2000" dirty="0"/>
               <a:t>, </a:t>
+            </a:r>
+            <a:r>
+              <a:rPr lang="ru-RU" sz="2000" dirty="0"/>
+              <a:t> </a:t>
             </a:r>
             <a:r>
               <a:rPr lang="en-US" sz="2000" dirty="0">
@@ -16907,17 +16946,6 @@
             </a:r>
             <a:r>
               <a:rPr lang="ru-RU" sz="2000" dirty="0"/>
-              <a:t>, инструкции с префиксом </a:t>
-            </a:r>
-            <a:r>
-              <a:rPr lang="en-US" sz="2000" dirty="0">
-                <a:latin typeface="Courier New" panose="02070309020205020404" pitchFamily="49" charset="0"/>
-                <a:cs typeface="Courier New" panose="02070309020205020404" pitchFamily="49" charset="0"/>
-              </a:rPr>
-              <a:t>LOCK</a:t>
-            </a:r>
-            <a:r>
-              <a:rPr lang="ru-RU" sz="2000" dirty="0"/>
               <a:t>)</a:t>
             </a:r>
             <a:r>
@@ -16926,15 +16954,15 @@
             </a:r>
             <a:r>
               <a:rPr lang="ru-RU" sz="2000" dirty="0"/>
-              <a:t>запрещают переупорядочивание микроопераций относительно себя (т.н. </a:t>
-            </a:r>
-            <a:r>
-              <a:rPr lang="ru-RU" sz="2000" dirty="0" err="1"/>
-              <a:t>сериализующие</a:t>
+              <a:t>запрещают переупорядочивание микроопераций относительно себя</a:t>
+            </a:r>
+            <a:r>
+              <a:rPr lang="en-US" sz="2000" dirty="0"/>
+              <a:t> </a:t>
             </a:r>
             <a:r>
               <a:rPr lang="ru-RU" sz="2000" dirty="0"/>
-              <a:t> инструкции).</a:t>
+              <a:t>и при этом дожидаются выполнения всех предыдущих инструкций.</a:t>
             </a:r>
           </a:p>
           <a:p>
@@ -16943,7 +16971,7 @@
             </a:pPr>
             <a:r>
               <a:rPr lang="ru-RU" sz="2000" dirty="0"/>
-              <a:t>Данные инструкции используются в многопоточном программировании для обеспечения корректного порядка выполнения действий. </a:t>
+              <a:t>Данные инструкции используются в основном в системном программировании для обеспечения корректного порядка выполнения действий. </a:t>
             </a:r>
           </a:p>
           <a:p>

</xml_diff>

<commit_message>
[~] Lecture7 [~] Lecture8 [~] Lecture9 <-> Lecture10
</commit_message>
<xml_diff>
--- a/Lectures/7.Microarchitecture/Lecture7.pptx
+++ b/Lectures/7.Microarchitecture/Lecture7.pptx
@@ -1467,7 +1467,7 @@
           <a:p>
             <a:fld id="{8A70136C-4900-4139-A65E-0FFE21BA8660}" type="datetimeFigureOut">
               <a:rPr lang="en-US" smtClean="0"/>
-              <a:t>12/15/2025</a:t>
+              <a:t>12/16/2025</a:t>
             </a:fld>
             <a:endParaRPr lang="en-US"/>
           </a:p>
@@ -30631,7 +30631,7 @@
                 <a:latin typeface="Courier New" panose="02070309020205020404" pitchFamily="49" charset="0"/>
                 <a:cs typeface="Courier New" panose="02070309020205020404" pitchFamily="49" charset="0"/>
               </a:rPr>
-              <a:t>ADD EDX,EAX    ; 2</a:t>
+              <a:t>ADD EDX,ECX    ; 2</a:t>
             </a:r>
           </a:p>
           <a:p>
@@ -31028,7 +31028,7 @@
                 <a:latin typeface="Courier New" panose="02070309020205020404" pitchFamily="49" charset="0"/>
                 <a:cs typeface="Courier New" panose="02070309020205020404" pitchFamily="49" charset="0"/>
               </a:rPr>
-              <a:t>, EAX   ; 2</a:t>
+              <a:t>, ECX   ; 2</a:t>
             </a:r>
           </a:p>
           <a:p>

</xml_diff>